<commit_message>
Rack szekreny kep beillesztese
</commit_message>
<xml_diff>
--- a/ecipo_palyazat/demokratak_dokumentacio.pptx
+++ b/ecipo_palyazat/demokratak_dokumentacio.pptx
@@ -12756,13 +12756,13 @@
   <p:clrMapOvr>
     <a:masterClrMapping/>
   </p:clrMapOvr>
-  <mc:AlternateContent xmlns:mc="http://schemas.openxmlformats.org/markup-compatibility/2006">
-    <mc:Choice xmlns:p15="http://schemas.microsoft.com/office/powerpoint/2012/main" Requires="p15">
+  <mc:AlternateContent xmlns:mc="http://schemas.openxmlformats.org/markup-compatibility/2006" xmlns:p15="http://schemas.microsoft.com/office/powerpoint/2012/main">
+    <mc:Choice Requires="p15">
       <p:transition xmlns:p14="http://schemas.microsoft.com/office/powerpoint/2010/main" spd="slow" p14:dur="2000">
         <p15:prstTrans prst="fallOver"/>
       </p:transition>
     </mc:Choice>
-    <mc:Fallback>
+    <mc:Fallback xmlns="">
       <p:transition spd="slow">
         <p:fade/>
       </p:transition>
@@ -12891,8 +12891,38 @@
         </p:blipFill>
         <p:spPr>
           <a:xfrm>
-            <a:off x="2593648" y="2937542"/>
-            <a:ext cx="6081618" cy="3835143"/>
+            <a:off x="1221628" y="3030226"/>
+            <a:ext cx="5241703" cy="3773336"/>
+          </a:xfrm>
+          <a:prstGeom prst="rect">
+            <a:avLst/>
+          </a:prstGeom>
+        </p:spPr>
+      </p:pic>
+      <p:pic>
+        <p:nvPicPr>
+          <p:cNvPr id="6" name="Kép 5"/>
+          <p:cNvPicPr>
+            <a:picLocks noChangeAspect="1"/>
+          </p:cNvPicPr>
+          <p:nvPr/>
+        </p:nvPicPr>
+        <p:blipFill>
+          <a:blip r:embed="rId3" cstate="print">
+            <a:extLst>
+              <a:ext uri="{28A0092B-C50C-407E-A947-70E740481C1C}">
+                <a14:useLocalDpi xmlns:a14="http://schemas.microsoft.com/office/drawing/2010/main" val="0"/>
+              </a:ext>
+            </a:extLst>
+          </a:blip>
+          <a:stretch>
+            <a:fillRect/>
+          </a:stretch>
+        </p:blipFill>
+        <p:spPr>
+          <a:xfrm>
+            <a:off x="6850545" y="3030226"/>
+            <a:ext cx="3325813" cy="3773336"/>
           </a:xfrm>
           <a:prstGeom prst="rect">
             <a:avLst/>
@@ -12909,13 +12939,13 @@
   <p:clrMapOvr>
     <a:masterClrMapping/>
   </p:clrMapOvr>
-  <mc:AlternateContent xmlns:mc="http://schemas.openxmlformats.org/markup-compatibility/2006">
-    <mc:Choice xmlns:p15="http://schemas.microsoft.com/office/powerpoint/2012/main" Requires="p15">
+  <mc:AlternateContent xmlns:mc="http://schemas.openxmlformats.org/markup-compatibility/2006" xmlns:p15="http://schemas.microsoft.com/office/powerpoint/2012/main">
+    <mc:Choice Requires="p15">
       <p:transition xmlns:p14="http://schemas.microsoft.com/office/powerpoint/2010/main" spd="slow" p14:dur="2000">
         <p15:prstTrans prst="fracture"/>
       </p:transition>
     </mc:Choice>
-    <mc:Fallback>
+    <mc:Fallback xmlns="">
       <p:transition spd="slow">
         <p:fade/>
       </p:transition>

</xml_diff>